<commit_message>
chore: update first slide
</commit_message>
<xml_diff>
--- a/Lab14 Open Lab/slides.pptx
+++ b/Lab14 Open Lab/slides.pptx
@@ -8170,7 +8170,7 @@
         </p:blipFill>
         <p:spPr>
           <a:xfrm>
-            <a:off x="21" y="12935"/>
+            <a:off x="-22185" y="230649"/>
             <a:ext cx="9143979" cy="6857990"/>
           </a:xfrm>
           <a:prstGeom prst="rect">
@@ -8376,6 +8376,52 @@
               <a:t>Global Flight Network</a:t>
             </a:r>
             <a:endParaRPr lang="en-US" sz="8000" dirty="0"/>
+          </a:p>
+        </p:txBody>
+      </p:sp>
+      <p:sp>
+        <p:nvSpPr>
+          <p:cNvPr id="8" name="TextBox 7">
+            <a:extLst>
+              <a:ext uri="{FF2B5EF4-FFF2-40B4-BE49-F238E27FC236}">
+                <a16:creationId xmlns:a16="http://schemas.microsoft.com/office/drawing/2014/main" id="{04FCF8A4-C26C-B0AC-BD83-C450A251A4B8}"/>
+              </a:ext>
+            </a:extLst>
+          </p:cNvPr>
+          <p:cNvSpPr txBox="1"/>
+          <p:nvPr/>
+        </p:nvSpPr>
+        <p:spPr>
+          <a:xfrm>
+            <a:off x="2046727" y="2976189"/>
+            <a:ext cx="5048260" cy="1061124"/>
+          </a:xfrm>
+          <a:prstGeom prst="rect">
+            <a:avLst/>
+          </a:prstGeom>
+        </p:spPr>
+        <p:txBody>
+          <a:bodyPr vert="horz" lIns="91440" tIns="45720" rIns="91440" bIns="45720" rtlCol="0" anchor="ctr">
+            <a:normAutofit/>
+          </a:bodyPr>
+          <a:lstStyle/>
+          <a:p>
+            <a:pPr defTabSz="914400">
+              <a:spcAft>
+                <a:spcPts val="600"/>
+              </a:spcAft>
+            </a:pPr>
+            <a:r>
+              <a:rPr lang="en-US" sz="4000" dirty="0">
+                <a:solidFill>
+                  <a:schemeClr val="accent6">
+                    <a:lumMod val="40000"/>
+                    <a:lumOff val="60000"/>
+                  </a:schemeClr>
+                </a:solidFill>
+              </a:rPr>
+              <a:t>Please use slideshow for the presentation.</a:t>
+            </a:r>
           </a:p>
         </p:txBody>
       </p:sp>
@@ -9812,13 +9858,13 @@
   <p:clrMapOvr>
     <a:overrideClrMapping bg1="dk1" tx1="lt1" bg2="dk2" tx2="lt2" accent1="accent1" accent2="accent2" accent3="accent3" accent4="accent4" accent5="accent5" accent6="accent6" hlink="hlink" folHlink="folHlink"/>
   </p:clrMapOvr>
-  <mc:AlternateContent xmlns:mc="http://schemas.openxmlformats.org/markup-compatibility/2006">
-    <mc:Choice xmlns:p159="http://schemas.microsoft.com/office/powerpoint/2015/09/main" Requires="p159">
+  <mc:AlternateContent xmlns:mc="http://schemas.openxmlformats.org/markup-compatibility/2006" xmlns:p159="http://schemas.microsoft.com/office/powerpoint/2015/09/main">
+    <mc:Choice Requires="p159">
       <p:transition spd="slow">
         <p159:morph option="byObject"/>
       </p:transition>
     </mc:Choice>
-    <mc:Fallback>
+    <mc:Fallback xmlns="">
       <p:transition spd="slow">
         <p:fade/>
       </p:transition>
@@ -14253,13 +14299,13 @@
   <p:clrMapOvr>
     <a:overrideClrMapping bg1="dk1" tx1="lt1" bg2="dk2" tx2="lt2" accent1="accent1" accent2="accent2" accent3="accent3" accent4="accent4" accent5="accent5" accent6="accent6" hlink="hlink" folHlink="folHlink"/>
   </p:clrMapOvr>
-  <mc:AlternateContent xmlns:mc="http://schemas.openxmlformats.org/markup-compatibility/2006">
-    <mc:Choice xmlns:p159="http://schemas.microsoft.com/office/powerpoint/2015/09/main" Requires="p159">
+  <mc:AlternateContent xmlns:mc="http://schemas.openxmlformats.org/markup-compatibility/2006" xmlns:p159="http://schemas.microsoft.com/office/powerpoint/2015/09/main">
+    <mc:Choice Requires="p159">
       <p:transition spd="slow">
         <p159:morph option="byObject"/>
       </p:transition>
     </mc:Choice>
-    <mc:Fallback>
+    <mc:Fallback xmlns="">
       <p:transition spd="slow">
         <p:fade/>
       </p:transition>
@@ -15723,13 +15769,13 @@
   <p:clrMapOvr>
     <a:overrideClrMapping bg1="dk1" tx1="lt1" bg2="dk2" tx2="lt2" accent1="accent1" accent2="accent2" accent3="accent3" accent4="accent4" accent5="accent5" accent6="accent6" hlink="hlink" folHlink="folHlink"/>
   </p:clrMapOvr>
-  <mc:AlternateContent xmlns:mc="http://schemas.openxmlformats.org/markup-compatibility/2006">
-    <mc:Choice xmlns:p159="http://schemas.microsoft.com/office/powerpoint/2015/09/main" Requires="p159">
+  <mc:AlternateContent xmlns:mc="http://schemas.openxmlformats.org/markup-compatibility/2006" xmlns:p159="http://schemas.microsoft.com/office/powerpoint/2015/09/main">
+    <mc:Choice Requires="p159">
       <p:transition spd="slow">
         <p159:morph option="byObject"/>
       </p:transition>
     </mc:Choice>
-    <mc:Fallback>
+    <mc:Fallback xmlns="">
       <p:transition spd="slow">
         <p:fade/>
       </p:transition>

</xml_diff>